<commit_message>
update with pcoa plots
</commit_message>
<xml_diff>
--- a/T1D Beta diversity update_10_August_2022.pptx
+++ b/T1D Beta diversity update_10_August_2022.pptx
@@ -13,6 +13,9 @@
     <p:sldId id="278" r:id="rId7"/>
     <p:sldId id="276" r:id="rId8"/>
     <p:sldId id="277" r:id="rId9"/>
+    <p:sldId id="279" r:id="rId10"/>
+    <p:sldId id="281" r:id="rId11"/>
+    <p:sldId id="282" r:id="rId12"/>
   </p:sldIdLst>
   <p:sldSz cx="12192000" cy="6858000"/>
   <p:notesSz cx="7010400" cy="9296400"/>
@@ -266,7 +269,7 @@
           <a:p>
             <a:fld id="{6BF516F6-F08C-4B4E-B77D-73F64E95C72B}" type="datetimeFigureOut">
               <a:rPr lang="en-US" smtClean="0"/>
-              <a:t>8/10/2022</a:t>
+              <a:t>8/12/2022</a:t>
             </a:fld>
             <a:endParaRPr lang="en-US"/>
           </a:p>
@@ -464,7 +467,7 @@
           <a:p>
             <a:fld id="{6BF516F6-F08C-4B4E-B77D-73F64E95C72B}" type="datetimeFigureOut">
               <a:rPr lang="en-US" smtClean="0"/>
-              <a:t>8/10/2022</a:t>
+              <a:t>8/12/2022</a:t>
             </a:fld>
             <a:endParaRPr lang="en-US"/>
           </a:p>
@@ -672,7 +675,7 @@
           <a:p>
             <a:fld id="{6BF516F6-F08C-4B4E-B77D-73F64E95C72B}" type="datetimeFigureOut">
               <a:rPr lang="en-US" smtClean="0"/>
-              <a:t>8/10/2022</a:t>
+              <a:t>8/12/2022</a:t>
             </a:fld>
             <a:endParaRPr lang="en-US"/>
           </a:p>
@@ -870,7 +873,7 @@
           <a:p>
             <a:fld id="{6BF516F6-F08C-4B4E-B77D-73F64E95C72B}" type="datetimeFigureOut">
               <a:rPr lang="en-US" smtClean="0"/>
-              <a:t>8/10/2022</a:t>
+              <a:t>8/12/2022</a:t>
             </a:fld>
             <a:endParaRPr lang="en-US"/>
           </a:p>
@@ -1145,7 +1148,7 @@
           <a:p>
             <a:fld id="{6BF516F6-F08C-4B4E-B77D-73F64E95C72B}" type="datetimeFigureOut">
               <a:rPr lang="en-US" smtClean="0"/>
-              <a:t>8/10/2022</a:t>
+              <a:t>8/12/2022</a:t>
             </a:fld>
             <a:endParaRPr lang="en-US"/>
           </a:p>
@@ -1410,7 +1413,7 @@
           <a:p>
             <a:fld id="{6BF516F6-F08C-4B4E-B77D-73F64E95C72B}" type="datetimeFigureOut">
               <a:rPr lang="en-US" smtClean="0"/>
-              <a:t>8/10/2022</a:t>
+              <a:t>8/12/2022</a:t>
             </a:fld>
             <a:endParaRPr lang="en-US"/>
           </a:p>
@@ -1822,7 +1825,7 @@
           <a:p>
             <a:fld id="{6BF516F6-F08C-4B4E-B77D-73F64E95C72B}" type="datetimeFigureOut">
               <a:rPr lang="en-US" smtClean="0"/>
-              <a:t>8/10/2022</a:t>
+              <a:t>8/12/2022</a:t>
             </a:fld>
             <a:endParaRPr lang="en-US"/>
           </a:p>
@@ -1963,7 +1966,7 @@
           <a:p>
             <a:fld id="{6BF516F6-F08C-4B4E-B77D-73F64E95C72B}" type="datetimeFigureOut">
               <a:rPr lang="en-US" smtClean="0"/>
-              <a:t>8/10/2022</a:t>
+              <a:t>8/12/2022</a:t>
             </a:fld>
             <a:endParaRPr lang="en-US"/>
           </a:p>
@@ -2076,7 +2079,7 @@
           <a:p>
             <a:fld id="{6BF516F6-F08C-4B4E-B77D-73F64E95C72B}" type="datetimeFigureOut">
               <a:rPr lang="en-US" smtClean="0"/>
-              <a:t>8/10/2022</a:t>
+              <a:t>8/12/2022</a:t>
             </a:fld>
             <a:endParaRPr lang="en-US"/>
           </a:p>
@@ -2387,7 +2390,7 @@
           <a:p>
             <a:fld id="{6BF516F6-F08C-4B4E-B77D-73F64E95C72B}" type="datetimeFigureOut">
               <a:rPr lang="en-US" smtClean="0"/>
-              <a:t>8/10/2022</a:t>
+              <a:t>8/12/2022</a:t>
             </a:fld>
             <a:endParaRPr lang="en-US"/>
           </a:p>
@@ -2675,7 +2678,7 @@
           <a:p>
             <a:fld id="{6BF516F6-F08C-4B4E-B77D-73F64E95C72B}" type="datetimeFigureOut">
               <a:rPr lang="en-US" smtClean="0"/>
-              <a:t>8/10/2022</a:t>
+              <a:t>8/12/2022</a:t>
             </a:fld>
             <a:endParaRPr lang="en-US"/>
           </a:p>
@@ -2916,7 +2919,7 @@
           <a:p>
             <a:fld id="{6BF516F6-F08C-4B4E-B77D-73F64E95C72B}" type="datetimeFigureOut">
               <a:rPr lang="en-US" smtClean="0"/>
-              <a:t>8/10/2022</a:t>
+              <a:t>8/12/2022</a:t>
             </a:fld>
             <a:endParaRPr lang="en-US"/>
           </a:p>
@@ -3402,6 +3405,224 @@
     <p:extLst>
       <p:ext uri="{BB962C8B-B14F-4D97-AF65-F5344CB8AC3E}">
         <p14:creationId xmlns:p14="http://schemas.microsoft.com/office/powerpoint/2010/main" val="3838671083"/>
+      </p:ext>
+    </p:extLst>
+  </p:cSld>
+  <p:clrMapOvr>
+    <a:masterClrMapping/>
+  </p:clrMapOvr>
+</p:sld>
+</file>
+
+<file path=ppt/slides/slide10.xml><?xml version="1.0" encoding="utf-8"?>
+<p:sld xmlns:a="http://schemas.openxmlformats.org/drawingml/2006/main" xmlns:r="http://schemas.openxmlformats.org/officeDocument/2006/relationships" xmlns:p="http://schemas.openxmlformats.org/presentationml/2006/main">
+  <p:cSld>
+    <p:bg>
+      <p:bgPr>
+        <a:solidFill>
+          <a:schemeClr val="bg1"/>
+        </a:solidFill>
+        <a:effectLst/>
+      </p:bgPr>
+    </p:bg>
+    <p:spTree>
+      <p:nvGrpSpPr>
+        <p:cNvPr id="1" name=""/>
+        <p:cNvGrpSpPr/>
+        <p:nvPr/>
+      </p:nvGrpSpPr>
+      <p:grpSpPr>
+        <a:xfrm>
+          <a:off x="0" y="0"/>
+          <a:ext cx="0" cy="0"/>
+          <a:chOff x="0" y="0"/>
+          <a:chExt cx="0" cy="0"/>
+        </a:xfrm>
+      </p:grpSpPr>
+      <p:pic>
+        <p:nvPicPr>
+          <p:cNvPr id="4" name="Picture 3" descr="Chart, scatter chart&#10;&#10;Description automatically generated">
+            <a:extLst>
+              <a:ext uri="{FF2B5EF4-FFF2-40B4-BE49-F238E27FC236}">
+                <a16:creationId xmlns:a16="http://schemas.microsoft.com/office/drawing/2014/main" id="{0255B643-19F6-3161-88D6-E080B162CA22}"/>
+              </a:ext>
+            </a:extLst>
+          </p:cNvPr>
+          <p:cNvPicPr>
+            <a:picLocks noChangeAspect="1"/>
+          </p:cNvPicPr>
+          <p:nvPr/>
+        </p:nvPicPr>
+        <p:blipFill>
+          <a:blip r:embed="rId2">
+            <a:extLst>
+              <a:ext uri="{28A0092B-C50C-407E-A947-70E740481C1C}">
+                <a14:useLocalDpi xmlns:a14="http://schemas.microsoft.com/office/drawing/2010/main" val="0"/>
+              </a:ext>
+            </a:extLst>
+          </a:blip>
+          <a:stretch>
+            <a:fillRect/>
+          </a:stretch>
+        </p:blipFill>
+        <p:spPr>
+          <a:xfrm>
+            <a:off x="380202" y="571101"/>
+            <a:ext cx="11431595" cy="5715798"/>
+          </a:xfrm>
+          <a:prstGeom prst="rect">
+            <a:avLst/>
+          </a:prstGeom>
+        </p:spPr>
+      </p:pic>
+      <p:sp>
+        <p:nvSpPr>
+          <p:cNvPr id="3" name="TextBox 2">
+            <a:extLst>
+              <a:ext uri="{FF2B5EF4-FFF2-40B4-BE49-F238E27FC236}">
+                <a16:creationId xmlns:a16="http://schemas.microsoft.com/office/drawing/2014/main" id="{3ABD8608-195D-92EA-93CE-76A79DB6AEA2}"/>
+              </a:ext>
+            </a:extLst>
+          </p:cNvPr>
+          <p:cNvSpPr txBox="1"/>
+          <p:nvPr/>
+        </p:nvSpPr>
+        <p:spPr>
+          <a:xfrm>
+            <a:off x="4149483" y="239635"/>
+            <a:ext cx="2485360" cy="369332"/>
+          </a:xfrm>
+          <a:prstGeom prst="rect">
+            <a:avLst/>
+          </a:prstGeom>
+          <a:noFill/>
+        </p:spPr>
+        <p:txBody>
+          <a:bodyPr wrap="none" rtlCol="0">
+            <a:spAutoFit/>
+          </a:bodyPr>
+          <a:lstStyle/>
+          <a:p>
+            <a:r>
+              <a:rPr lang="en-US" dirty="0"/>
+              <a:t>Other possible examples</a:t>
+            </a:r>
+          </a:p>
+        </p:txBody>
+      </p:sp>
+    </p:spTree>
+    <p:extLst>
+      <p:ext uri="{BB962C8B-B14F-4D97-AF65-F5344CB8AC3E}">
+        <p14:creationId xmlns:p14="http://schemas.microsoft.com/office/powerpoint/2010/main" val="2875240996"/>
+      </p:ext>
+    </p:extLst>
+  </p:cSld>
+  <p:clrMapOvr>
+    <a:masterClrMapping/>
+  </p:clrMapOvr>
+</p:sld>
+</file>
+
+<file path=ppt/slides/slide11.xml><?xml version="1.0" encoding="utf-8"?>
+<p:sld xmlns:a="http://schemas.openxmlformats.org/drawingml/2006/main" xmlns:r="http://schemas.openxmlformats.org/officeDocument/2006/relationships" xmlns:p="http://schemas.openxmlformats.org/presentationml/2006/main">
+  <p:cSld>
+    <p:bg>
+      <p:bgPr>
+        <a:solidFill>
+          <a:schemeClr val="bg1"/>
+        </a:solidFill>
+        <a:effectLst/>
+      </p:bgPr>
+    </p:bg>
+    <p:spTree>
+      <p:nvGrpSpPr>
+        <p:cNvPr id="1" name=""/>
+        <p:cNvGrpSpPr/>
+        <p:nvPr/>
+      </p:nvGrpSpPr>
+      <p:grpSpPr>
+        <a:xfrm>
+          <a:off x="0" y="0"/>
+          <a:ext cx="0" cy="0"/>
+          <a:chOff x="0" y="0"/>
+          <a:chExt cx="0" cy="0"/>
+        </a:xfrm>
+      </p:grpSpPr>
+      <p:pic>
+        <p:nvPicPr>
+          <p:cNvPr id="3" name="Picture 2" descr="Chart, scatter chart&#10;&#10;Description automatically generated">
+            <a:extLst>
+              <a:ext uri="{FF2B5EF4-FFF2-40B4-BE49-F238E27FC236}">
+                <a16:creationId xmlns:a16="http://schemas.microsoft.com/office/drawing/2014/main" id="{738C5ECE-DC7D-FB24-9052-C9FE8D6F02C8}"/>
+              </a:ext>
+            </a:extLst>
+          </p:cNvPr>
+          <p:cNvPicPr>
+            <a:picLocks noChangeAspect="1"/>
+          </p:cNvPicPr>
+          <p:nvPr/>
+        </p:nvPicPr>
+        <p:blipFill>
+          <a:blip r:embed="rId2">
+            <a:extLst>
+              <a:ext uri="{28A0092B-C50C-407E-A947-70E740481C1C}">
+                <a14:useLocalDpi xmlns:a14="http://schemas.microsoft.com/office/drawing/2010/main" val="0"/>
+              </a:ext>
+            </a:extLst>
+          </a:blip>
+          <a:stretch>
+            <a:fillRect/>
+          </a:stretch>
+        </p:blipFill>
+        <p:spPr>
+          <a:xfrm>
+            <a:off x="380202" y="571101"/>
+            <a:ext cx="11431595" cy="5715798"/>
+          </a:xfrm>
+          <a:prstGeom prst="rect">
+            <a:avLst/>
+          </a:prstGeom>
+        </p:spPr>
+      </p:pic>
+      <p:sp>
+        <p:nvSpPr>
+          <p:cNvPr id="5" name="TextBox 4">
+            <a:extLst>
+              <a:ext uri="{FF2B5EF4-FFF2-40B4-BE49-F238E27FC236}">
+                <a16:creationId xmlns:a16="http://schemas.microsoft.com/office/drawing/2014/main" id="{3744D4FD-D659-659A-CCAB-80679D6A44B7}"/>
+              </a:ext>
+            </a:extLst>
+          </p:cNvPr>
+          <p:cNvSpPr txBox="1"/>
+          <p:nvPr/>
+        </p:nvSpPr>
+        <p:spPr>
+          <a:xfrm>
+            <a:off x="4149483" y="239635"/>
+            <a:ext cx="2485360" cy="369332"/>
+          </a:xfrm>
+          <a:prstGeom prst="rect">
+            <a:avLst/>
+          </a:prstGeom>
+          <a:noFill/>
+        </p:spPr>
+        <p:txBody>
+          <a:bodyPr wrap="none" rtlCol="0">
+            <a:spAutoFit/>
+          </a:bodyPr>
+          <a:lstStyle/>
+          <a:p>
+            <a:r>
+              <a:rPr lang="en-US" dirty="0"/>
+              <a:t>Other possible examples</a:t>
+            </a:r>
+          </a:p>
+        </p:txBody>
+      </p:sp>
+    </p:spTree>
+    <p:extLst>
+      <p:ext uri="{BB962C8B-B14F-4D97-AF65-F5344CB8AC3E}">
+        <p14:creationId xmlns:p14="http://schemas.microsoft.com/office/powerpoint/2010/main" val="1066015311"/>
       </p:ext>
     </p:extLst>
   </p:cSld>
@@ -27334,6 +27555,310 @@
 </p:sld>
 </file>
 
+<file path=ppt/slides/slide9.xml><?xml version="1.0" encoding="utf-8"?>
+<p:sld xmlns:a="http://schemas.openxmlformats.org/drawingml/2006/main" xmlns:r="http://schemas.openxmlformats.org/officeDocument/2006/relationships" xmlns:p="http://schemas.openxmlformats.org/presentationml/2006/main">
+  <p:cSld>
+    <p:bg>
+      <p:bgPr>
+        <a:solidFill>
+          <a:schemeClr val="bg1"/>
+        </a:solidFill>
+        <a:effectLst/>
+      </p:bgPr>
+    </p:bg>
+    <p:spTree>
+      <p:nvGrpSpPr>
+        <p:cNvPr id="1" name=""/>
+        <p:cNvGrpSpPr/>
+        <p:nvPr/>
+      </p:nvGrpSpPr>
+      <p:grpSpPr>
+        <a:xfrm>
+          <a:off x="0" y="0"/>
+          <a:ext cx="0" cy="0"/>
+          <a:chOff x="0" y="0"/>
+          <a:chExt cx="0" cy="0"/>
+        </a:xfrm>
+      </p:grpSpPr>
+      <p:grpSp>
+        <p:nvGrpSpPr>
+          <p:cNvPr id="14" name="Group 13">
+            <a:extLst>
+              <a:ext uri="{FF2B5EF4-FFF2-40B4-BE49-F238E27FC236}">
+                <a16:creationId xmlns:a16="http://schemas.microsoft.com/office/drawing/2014/main" id="{C38144E7-14BC-818A-A1C4-2A3666CE2627}"/>
+              </a:ext>
+            </a:extLst>
+          </p:cNvPr>
+          <p:cNvGrpSpPr/>
+          <p:nvPr/>
+        </p:nvGrpSpPr>
+        <p:grpSpPr>
+          <a:xfrm>
+            <a:off x="214411" y="1040524"/>
+            <a:ext cx="12082692" cy="4426190"/>
+            <a:chOff x="533071" y="2014538"/>
+            <a:chExt cx="10457297" cy="3452175"/>
+          </a:xfrm>
+        </p:grpSpPr>
+        <p:pic>
+          <p:nvPicPr>
+            <p:cNvPr id="11" name="Picture 10" descr="Diagram&#10;&#10;Description automatically generated">
+              <a:extLst>
+                <a:ext uri="{FF2B5EF4-FFF2-40B4-BE49-F238E27FC236}">
+                  <a16:creationId xmlns:a16="http://schemas.microsoft.com/office/drawing/2014/main" id="{C6D70A5A-8C6F-9074-7A66-51ED154969D3}"/>
+                </a:ext>
+              </a:extLst>
+            </p:cNvPr>
+            <p:cNvPicPr>
+              <a:picLocks noChangeAspect="1"/>
+            </p:cNvPicPr>
+            <p:nvPr/>
+          </p:nvPicPr>
+          <p:blipFill rotWithShape="1">
+            <a:blip r:embed="rId2">
+              <a:extLst>
+                <a:ext uri="{28A0092B-C50C-407E-A947-70E740481C1C}">
+                  <a14:useLocalDpi xmlns:a14="http://schemas.microsoft.com/office/drawing/2010/main" val="0"/>
+                </a:ext>
+              </a:extLst>
+            </a:blip>
+            <a:srcRect t="11103"/>
+            <a:stretch/>
+          </p:blipFill>
+          <p:spPr>
+            <a:xfrm>
+              <a:off x="765694" y="3523844"/>
+              <a:ext cx="3278292" cy="1942869"/>
+            </a:xfrm>
+            <a:prstGeom prst="rect">
+              <a:avLst/>
+            </a:prstGeom>
+          </p:spPr>
+        </p:pic>
+        <p:pic>
+          <p:nvPicPr>
+            <p:cNvPr id="7" name="Picture 6" descr="Diagram&#10;&#10;Description automatically generated">
+              <a:extLst>
+                <a:ext uri="{FF2B5EF4-FFF2-40B4-BE49-F238E27FC236}">
+                  <a16:creationId xmlns:a16="http://schemas.microsoft.com/office/drawing/2014/main" id="{E9B1A4DE-AB2B-F555-1464-35DFD1A163A0}"/>
+                </a:ext>
+              </a:extLst>
+            </p:cNvPr>
+            <p:cNvPicPr>
+              <a:picLocks noChangeAspect="1"/>
+            </p:cNvPicPr>
+            <p:nvPr/>
+          </p:nvPicPr>
+          <p:blipFill rotWithShape="1">
+            <a:blip r:embed="rId3">
+              <a:extLst>
+                <a:ext uri="{28A0092B-C50C-407E-A947-70E740481C1C}">
+                  <a14:useLocalDpi xmlns:a14="http://schemas.microsoft.com/office/drawing/2010/main" val="0"/>
+                </a:ext>
+              </a:extLst>
+            </a:blip>
+            <a:srcRect t="9735" b="11919"/>
+            <a:stretch/>
+          </p:blipFill>
+          <p:spPr>
+            <a:xfrm>
+              <a:off x="4111097" y="3356558"/>
+              <a:ext cx="3743538" cy="1955297"/>
+            </a:xfrm>
+            <a:prstGeom prst="rect">
+              <a:avLst/>
+            </a:prstGeom>
+          </p:spPr>
+        </p:pic>
+        <p:pic>
+          <p:nvPicPr>
+            <p:cNvPr id="5" name="Picture 4" descr="Diagram&#10;&#10;Description automatically generated">
+              <a:extLst>
+                <a:ext uri="{FF2B5EF4-FFF2-40B4-BE49-F238E27FC236}">
+                  <a16:creationId xmlns:a16="http://schemas.microsoft.com/office/drawing/2014/main" id="{BF4FE6AA-B4B2-1677-2085-2E5DDA4D39A3}"/>
+                </a:ext>
+              </a:extLst>
+            </p:cNvPr>
+            <p:cNvPicPr>
+              <a:picLocks noChangeAspect="1"/>
+            </p:cNvPicPr>
+            <p:nvPr/>
+          </p:nvPicPr>
+          <p:blipFill rotWithShape="1">
+            <a:blip r:embed="rId4">
+              <a:extLst>
+                <a:ext uri="{28A0092B-C50C-407E-A947-70E740481C1C}">
+                  <a14:useLocalDpi xmlns:a14="http://schemas.microsoft.com/office/drawing/2010/main" val="0"/>
+                </a:ext>
+              </a:extLst>
+            </a:blip>
+            <a:srcRect t="16280" b="22200"/>
+            <a:stretch/>
+          </p:blipFill>
+          <p:spPr>
+            <a:xfrm>
+              <a:off x="7483395" y="2089547"/>
+              <a:ext cx="3239769" cy="1328737"/>
+            </a:xfrm>
+            <a:prstGeom prst="rect">
+              <a:avLst/>
+            </a:prstGeom>
+          </p:spPr>
+        </p:pic>
+        <p:pic>
+          <p:nvPicPr>
+            <p:cNvPr id="9" name="Picture 8" descr="Diagram&#10;&#10;Description automatically generated">
+              <a:extLst>
+                <a:ext uri="{FF2B5EF4-FFF2-40B4-BE49-F238E27FC236}">
+                  <a16:creationId xmlns:a16="http://schemas.microsoft.com/office/drawing/2014/main" id="{DEE095A8-4E35-3D6E-0BA8-838390E5F8B1}"/>
+                </a:ext>
+              </a:extLst>
+            </p:cNvPr>
+            <p:cNvPicPr>
+              <a:picLocks noChangeAspect="1"/>
+            </p:cNvPicPr>
+            <p:nvPr/>
+          </p:nvPicPr>
+          <p:blipFill rotWithShape="1">
+            <a:blip r:embed="rId5">
+              <a:extLst>
+                <a:ext uri="{28A0092B-C50C-407E-A947-70E740481C1C}">
+                  <a14:useLocalDpi xmlns:a14="http://schemas.microsoft.com/office/drawing/2010/main" val="0"/>
+                </a:ext>
+              </a:extLst>
+            </a:blip>
+            <a:srcRect t="17651" b="21552"/>
+            <a:stretch/>
+          </p:blipFill>
+          <p:spPr>
+            <a:xfrm>
+              <a:off x="4273830" y="2014538"/>
+              <a:ext cx="3278292" cy="1328737"/>
+            </a:xfrm>
+            <a:prstGeom prst="rect">
+              <a:avLst/>
+            </a:prstGeom>
+          </p:spPr>
+        </p:pic>
+        <p:pic>
+          <p:nvPicPr>
+            <p:cNvPr id="13" name="Picture 12" descr="Diagram&#10;&#10;Description automatically generated">
+              <a:extLst>
+                <a:ext uri="{FF2B5EF4-FFF2-40B4-BE49-F238E27FC236}">
+                  <a16:creationId xmlns:a16="http://schemas.microsoft.com/office/drawing/2014/main" id="{B7FE5BF7-7681-8323-B35A-E93739A80E7A}"/>
+                </a:ext>
+              </a:extLst>
+            </p:cNvPr>
+            <p:cNvPicPr>
+              <a:picLocks noChangeAspect="1"/>
+            </p:cNvPicPr>
+            <p:nvPr/>
+          </p:nvPicPr>
+          <p:blipFill rotWithShape="1">
+            <a:blip r:embed="rId6">
+              <a:extLst>
+                <a:ext uri="{28A0092B-C50C-407E-A947-70E740481C1C}">
+                  <a14:useLocalDpi xmlns:a14="http://schemas.microsoft.com/office/drawing/2010/main" val="0"/>
+                </a:ext>
+              </a:extLst>
+            </a:blip>
+            <a:srcRect t="19464" b="21283"/>
+            <a:stretch/>
+          </p:blipFill>
+          <p:spPr>
+            <a:xfrm>
+              <a:off x="533071" y="2014538"/>
+              <a:ext cx="3743538" cy="1478756"/>
+            </a:xfrm>
+            <a:prstGeom prst="rect">
+              <a:avLst/>
+            </a:prstGeom>
+          </p:spPr>
+        </p:pic>
+        <p:pic>
+          <p:nvPicPr>
+            <p:cNvPr id="3" name="Picture 2" descr="Diagram&#10;&#10;Description automatically generated">
+              <a:extLst>
+                <a:ext uri="{FF2B5EF4-FFF2-40B4-BE49-F238E27FC236}">
+                  <a16:creationId xmlns:a16="http://schemas.microsoft.com/office/drawing/2014/main" id="{17A8190F-410B-6661-16FD-B1BC625FF7DC}"/>
+                </a:ext>
+              </a:extLst>
+            </p:cNvPr>
+            <p:cNvPicPr>
+              <a:picLocks noChangeAspect="1"/>
+            </p:cNvPicPr>
+            <p:nvPr/>
+          </p:nvPicPr>
+          <p:blipFill rotWithShape="1">
+            <a:blip r:embed="rId7">
+              <a:extLst>
+                <a:ext uri="{28A0092B-C50C-407E-A947-70E740481C1C}">
+                  <a14:useLocalDpi xmlns:a14="http://schemas.microsoft.com/office/drawing/2010/main" val="0"/>
+                </a:ext>
+              </a:extLst>
+            </a:blip>
+            <a:srcRect t="10046" b="13594"/>
+            <a:stretch/>
+          </p:blipFill>
+          <p:spPr>
+            <a:xfrm>
+              <a:off x="7750599" y="3493293"/>
+              <a:ext cx="3239769" cy="1649256"/>
+            </a:xfrm>
+            <a:prstGeom prst="rect">
+              <a:avLst/>
+            </a:prstGeom>
+          </p:spPr>
+        </p:pic>
+      </p:grpSp>
+      <p:sp>
+        <p:nvSpPr>
+          <p:cNvPr id="15" name="TextBox 14">
+            <a:extLst>
+              <a:ext uri="{FF2B5EF4-FFF2-40B4-BE49-F238E27FC236}">
+                <a16:creationId xmlns:a16="http://schemas.microsoft.com/office/drawing/2014/main" id="{9F38BB83-1D90-9ECC-329D-717A2404866C}"/>
+              </a:ext>
+            </a:extLst>
+          </p:cNvPr>
+          <p:cNvSpPr txBox="1"/>
+          <p:nvPr/>
+        </p:nvSpPr>
+        <p:spPr>
+          <a:xfrm>
+            <a:off x="4149483" y="239635"/>
+            <a:ext cx="2485360" cy="369332"/>
+          </a:xfrm>
+          <a:prstGeom prst="rect">
+            <a:avLst/>
+          </a:prstGeom>
+          <a:noFill/>
+        </p:spPr>
+        <p:txBody>
+          <a:bodyPr wrap="none" rtlCol="0">
+            <a:spAutoFit/>
+          </a:bodyPr>
+          <a:lstStyle/>
+          <a:p>
+            <a:r>
+              <a:rPr lang="en-US" dirty="0"/>
+              <a:t>Other possible examples</a:t>
+            </a:r>
+          </a:p>
+        </p:txBody>
+      </p:sp>
+    </p:spTree>
+    <p:extLst>
+      <p:ext uri="{BB962C8B-B14F-4D97-AF65-F5344CB8AC3E}">
+        <p14:creationId xmlns:p14="http://schemas.microsoft.com/office/powerpoint/2010/main" val="3192423045"/>
+      </p:ext>
+    </p:extLst>
+  </p:cSld>
+  <p:clrMapOvr>
+    <a:masterClrMapping/>
+  </p:clrMapOvr>
+</p:sld>
+</file>
+
 <file path=ppt/theme/theme1.xml><?xml version="1.0" encoding="utf-8"?>
 <a:theme xmlns:a="http://schemas.openxmlformats.org/drawingml/2006/main" name="Office Theme">
   <a:themeElements>

</xml_diff>